<commit_message>
Revisions to blueprint and webbrowsing
</commit_message>
<xml_diff>
--- a/Slides/IETF 117 ROSA blueprint.pptx
+++ b/Slides/IETF 117 ROSA blueprint.pptx
@@ -5,7 +5,7 @@
     <p:sldMasterId id="2147483648" r:id="rId1"/>
   </p:sldMasterIdLst>
   <p:notesMasterIdLst>
-    <p:notesMasterId r:id="rId12"/>
+    <p:notesMasterId r:id="rId11"/>
   </p:notesMasterIdLst>
   <p:sldIdLst>
     <p:sldId id="325" r:id="rId2"/>
@@ -16,8 +16,7 @@
     <p:sldId id="487" r:id="rId7"/>
     <p:sldId id="488" r:id="rId8"/>
     <p:sldId id="489" r:id="rId9"/>
-    <p:sldId id="490" r:id="rId10"/>
-    <p:sldId id="364" r:id="rId11"/>
+    <p:sldId id="364" r:id="rId10"/>
   </p:sldIdLst>
   <p:sldSz cx="12192000" cy="6858000"/>
   <p:notesSz cx="6858000" cy="9144000"/>
@@ -129,7 +128,6 @@
             <p14:sldId id="487"/>
             <p14:sldId id="488"/>
             <p14:sldId id="489"/>
-            <p14:sldId id="490"/>
           </p14:sldIdLst>
         </p14:section>
         <p14:section name="Ending" id="{D9FEE994-D176-4E74-BA23-5B415FDB4F81}">
@@ -240,7 +238,7 @@
           <a:p>
             <a:fld id="{8E9276A9-F8EA-4524-A57D-AC15174C1E8D}" type="datetimeFigureOut">
               <a:rPr lang="zh-CN" altLang="en-US" smtClean="0"/>
-              <a:t>2023/7/14</a:t>
+              <a:t>2023/7/25</a:t>
             </a:fld>
             <a:endParaRPr lang="zh-CN" altLang="en-US"/>
           </a:p>
@@ -1244,7 +1242,7 @@
           <a:p>
             <a:fld id="{814E3FA4-70BC-4709-9C87-D20BF4DEA2E8}" type="slidenum">
               <a:rPr lang="zh-CN" altLang="en-US" smtClean="0"/>
-              <a:t>10</a:t>
+              <a:t>9</a:t>
             </a:fld>
             <a:endParaRPr lang="zh-CN" altLang="en-US"/>
           </a:p>
@@ -7059,7 +7057,7 @@
   <p:clrMapOvr>
     <a:masterClrMapping/>
   </p:clrMapOvr>
-  <p:extLst mod="1">
+  <p:extLst>
     <p:ext uri="{DCECCB84-F9BA-43D5-87BE-67443E8EF086}">
       <p15:sldGuideLst xmlns:p15="http://schemas.microsoft.com/office/powerpoint/2012/main">
         <p15:guide id="2" pos="3842">
@@ -7935,367 +7933,6 @@
     <p:extLst>
       <p:ext uri="{BB962C8B-B14F-4D97-AF65-F5344CB8AC3E}">
         <p14:creationId xmlns:p14="http://schemas.microsoft.com/office/powerpoint/2010/main" val="1186085020"/>
-      </p:ext>
-    </p:extLst>
-  </p:cSld>
-  <p:clrMapOvr>
-    <a:masterClrMapping/>
-  </p:clrMapOvr>
-</p:sld>
-</file>
-
-<file path=ppt/slides/slide10.xml><?xml version="1.0" encoding="utf-8"?>
-<p:sld xmlns:a="http://schemas.openxmlformats.org/drawingml/2006/main" xmlns:r="http://schemas.openxmlformats.org/officeDocument/2006/relationships" xmlns:p="http://schemas.openxmlformats.org/presentationml/2006/main">
-  <p:cSld>
-    <p:spTree>
-      <p:nvGrpSpPr>
-        <p:cNvPr id="1" name=""/>
-        <p:cNvGrpSpPr/>
-        <p:nvPr/>
-      </p:nvGrpSpPr>
-      <p:grpSpPr>
-        <a:xfrm>
-          <a:off x="0" y="0"/>
-          <a:ext cx="0" cy="0"/>
-          <a:chOff x="0" y="0"/>
-          <a:chExt cx="0" cy="0"/>
-        </a:xfrm>
-      </p:grpSpPr>
-      <p:sp>
-        <p:nvSpPr>
-          <p:cNvPr id="16" name="文本框 15"/>
-          <p:cNvSpPr txBox="1"/>
-          <p:nvPr/>
-        </p:nvSpPr>
-        <p:spPr>
-          <a:xfrm>
-            <a:off x="475595" y="937268"/>
-            <a:ext cx="7058250" cy="348813"/>
-          </a:xfrm>
-          <a:prstGeom prst="rect">
-            <a:avLst/>
-          </a:prstGeom>
-          <a:noFill/>
-        </p:spPr>
-        <p:txBody>
-          <a:bodyPr wrap="square" rtlCol="0">
-            <a:spAutoFit/>
-          </a:bodyPr>
-          <a:lstStyle/>
-          <a:p>
-            <a:pPr>
-              <a:lnSpc>
-                <a:spcPts val="2000"/>
-              </a:lnSpc>
-            </a:pPr>
-            <a:r>
-              <a:rPr lang="en-US" altLang="zh-CN" b="1" dirty="0">
-                <a:solidFill>
-                  <a:schemeClr val="tx1">
-                    <a:lumMod val="75000"/>
-                    <a:lumOff val="25000"/>
-                  </a:schemeClr>
-                </a:solidFill>
-              </a:rPr>
-              <a:t>IETF117 – ROSA side meeting</a:t>
-            </a:r>
-            <a:endParaRPr lang="zh-CN" altLang="en-US" sz="1200" b="1" dirty="0">
-              <a:solidFill>
-                <a:schemeClr val="tx1">
-                  <a:lumMod val="75000"/>
-                  <a:lumOff val="25000"/>
-                </a:schemeClr>
-              </a:solidFill>
-              <a:latin typeface="微软雅黑" panose="020B0503020204020204" pitchFamily="34" charset="-122"/>
-              <a:ea typeface="微软雅黑" panose="020B0503020204020204" pitchFamily="34" charset="-122"/>
-            </a:endParaRPr>
-          </a:p>
-        </p:txBody>
-      </p:sp>
-      <p:sp>
-        <p:nvSpPr>
-          <p:cNvPr id="17" name="文本框 16"/>
-          <p:cNvSpPr txBox="1"/>
-          <p:nvPr/>
-        </p:nvSpPr>
-        <p:spPr>
-          <a:xfrm>
-            <a:off x="475595" y="1200332"/>
-            <a:ext cx="8630377" cy="571695"/>
-          </a:xfrm>
-          <a:prstGeom prst="rect">
-            <a:avLst/>
-          </a:prstGeom>
-          <a:noFill/>
-        </p:spPr>
-        <p:txBody>
-          <a:bodyPr wrap="square" rtlCol="0">
-            <a:spAutoFit/>
-          </a:bodyPr>
-          <a:lstStyle/>
-          <a:p>
-            <a:pPr>
-              <a:lnSpc>
-                <a:spcPts val="2000"/>
-              </a:lnSpc>
-            </a:pPr>
-            <a:r>
-              <a:rPr lang="en-US" altLang="zh-CN" sz="1000" b="1" dirty="0">
-                <a:solidFill>
-                  <a:schemeClr val="tx1">
-                    <a:lumMod val="75000"/>
-                    <a:lumOff val="25000"/>
-                  </a:schemeClr>
-                </a:solidFill>
-                <a:latin typeface="微软雅黑" panose="020B0503020204020204" pitchFamily="34" charset="-122"/>
-                <a:ea typeface="微软雅黑" panose="020B0503020204020204" pitchFamily="34" charset="-122"/>
-                <a:hlinkClick r:id="rId3"/>
-              </a:rPr>
-              <a:t>https://datatracker.ietf.org/doc/draft-contreras-rtgwg-rosa-gaar/</a:t>
-            </a:r>
-            <a:r>
-              <a:rPr lang="en-US" altLang="zh-CN" sz="1000" b="1" dirty="0">
-                <a:solidFill>
-                  <a:schemeClr val="tx1">
-                    <a:lumMod val="75000"/>
-                    <a:lumOff val="25000"/>
-                  </a:schemeClr>
-                </a:solidFill>
-                <a:latin typeface="微软雅黑" panose="020B0503020204020204" pitchFamily="34" charset="-122"/>
-                <a:ea typeface="微软雅黑" panose="020B0503020204020204" pitchFamily="34" charset="-122"/>
-              </a:rPr>
-              <a:t> </a:t>
-            </a:r>
-          </a:p>
-          <a:p>
-            <a:pPr>
-              <a:lnSpc>
-                <a:spcPts val="2000"/>
-              </a:lnSpc>
-            </a:pPr>
-            <a:r>
-              <a:rPr lang="en-US" altLang="zh-CN" sz="1000" b="1" dirty="0">
-                <a:solidFill>
-                  <a:schemeClr val="tx1">
-                    <a:lumMod val="75000"/>
-                    <a:lumOff val="25000"/>
-                  </a:schemeClr>
-                </a:solidFill>
-                <a:latin typeface="微软雅黑" panose="020B0503020204020204" pitchFamily="34" charset="-122"/>
-                <a:ea typeface="微软雅黑" panose="020B0503020204020204" pitchFamily="34" charset="-122"/>
-                <a:hlinkClick r:id="rId4"/>
-              </a:rPr>
-              <a:t>https://datatracker.ietf.org/doc/html/draft-trossen-rtgwg-rosa-arch</a:t>
-            </a:r>
-            <a:r>
-              <a:rPr lang="en-US" altLang="zh-CN" sz="1000" b="1" dirty="0">
-                <a:solidFill>
-                  <a:schemeClr val="tx1">
-                    <a:lumMod val="75000"/>
-                    <a:lumOff val="25000"/>
-                  </a:schemeClr>
-                </a:solidFill>
-                <a:latin typeface="微软雅黑" panose="020B0503020204020204" pitchFamily="34" charset="-122"/>
-                <a:ea typeface="微软雅黑" panose="020B0503020204020204" pitchFamily="34" charset="-122"/>
-              </a:rPr>
-              <a:t> </a:t>
-            </a:r>
-            <a:endParaRPr lang="zh-CN" altLang="en-US" sz="1000" b="1" dirty="0">
-              <a:solidFill>
-                <a:schemeClr val="tx1">
-                  <a:lumMod val="75000"/>
-                  <a:lumOff val="25000"/>
-                </a:schemeClr>
-              </a:solidFill>
-              <a:latin typeface="微软雅黑" panose="020B0503020204020204" pitchFamily="34" charset="-122"/>
-              <a:ea typeface="微软雅黑" panose="020B0503020204020204" pitchFamily="34" charset="-122"/>
-            </a:endParaRPr>
-          </a:p>
-        </p:txBody>
-      </p:sp>
-      <p:sp>
-        <p:nvSpPr>
-          <p:cNvPr id="6" name="文本框 14">
-            <a:extLst>
-              <a:ext uri="{FF2B5EF4-FFF2-40B4-BE49-F238E27FC236}">
-                <a16:creationId xmlns:a16="http://schemas.microsoft.com/office/drawing/2014/main" id="{E6E3A1F1-5B8D-4B72-B605-E66C5704BD09}"/>
-              </a:ext>
-            </a:extLst>
-          </p:cNvPr>
-          <p:cNvSpPr txBox="1"/>
-          <p:nvPr/>
-        </p:nvSpPr>
-        <p:spPr>
-          <a:xfrm>
-            <a:off x="475595" y="5051881"/>
-            <a:ext cx="4385653" cy="1164550"/>
-          </a:xfrm>
-          <a:prstGeom prst="rect">
-            <a:avLst/>
-          </a:prstGeom>
-          <a:noFill/>
-        </p:spPr>
-        <p:txBody>
-          <a:bodyPr wrap="square" rtlCol="0">
-            <a:spAutoFit/>
-          </a:bodyPr>
-          <a:lstStyle/>
-          <a:p>
-            <a:pPr>
-              <a:lnSpc>
-                <a:spcPct val="150000"/>
-              </a:lnSpc>
-            </a:pPr>
-            <a:endParaRPr lang="en-US" altLang="zh-CN" b="1" dirty="0">
-              <a:solidFill>
-                <a:schemeClr val="tx1">
-                  <a:lumMod val="75000"/>
-                  <a:lumOff val="25000"/>
-                </a:schemeClr>
-              </a:solidFill>
-              <a:latin typeface="微软雅黑" panose="020B0503020204020204" pitchFamily="34" charset="-122"/>
-              <a:ea typeface="微软雅黑" panose="020B0503020204020204" pitchFamily="34" charset="-122"/>
-            </a:endParaRPr>
-          </a:p>
-          <a:p>
-            <a:pPr>
-              <a:lnSpc>
-                <a:spcPct val="150000"/>
-              </a:lnSpc>
-            </a:pPr>
-            <a:r>
-              <a:rPr lang="en-US" altLang="zh-CN" b="1" dirty="0">
-                <a:solidFill>
-                  <a:schemeClr val="tx1">
-                    <a:lumMod val="75000"/>
-                    <a:lumOff val="25000"/>
-                  </a:schemeClr>
-                </a:solidFill>
-                <a:latin typeface="微软雅黑" panose="020B0503020204020204" pitchFamily="34" charset="-122"/>
-                <a:ea typeface="微软雅黑" panose="020B0503020204020204" pitchFamily="34" charset="-122"/>
-              </a:rPr>
-              <a:t>THANKS!</a:t>
-            </a:r>
-          </a:p>
-          <a:p>
-            <a:pPr>
-              <a:lnSpc>
-                <a:spcPts val="2000"/>
-              </a:lnSpc>
-            </a:pPr>
-            <a:r>
-              <a:rPr lang="en-US" altLang="zh-CN" sz="1600" b="1" dirty="0">
-                <a:solidFill>
-                  <a:schemeClr val="tx1">
-                    <a:lumMod val="75000"/>
-                    <a:lumOff val="25000"/>
-                  </a:schemeClr>
-                </a:solidFill>
-                <a:latin typeface="微软雅黑" panose="020B0503020204020204" pitchFamily="34" charset="-122"/>
-                <a:ea typeface="微软雅黑" panose="020B0503020204020204" pitchFamily="34" charset="-122"/>
-              </a:rPr>
-              <a:t>24.07.2023</a:t>
-            </a:r>
-          </a:p>
-        </p:txBody>
-      </p:sp>
-      <p:sp>
-        <p:nvSpPr>
-          <p:cNvPr id="8" name="标题 1">
-            <a:extLst>
-              <a:ext uri="{FF2B5EF4-FFF2-40B4-BE49-F238E27FC236}">
-                <a16:creationId xmlns:a16="http://schemas.microsoft.com/office/drawing/2014/main" id="{5FCF00CF-42D9-4CF9-9FBB-6580E1FB8307}"/>
-              </a:ext>
-            </a:extLst>
-          </p:cNvPr>
-          <p:cNvSpPr txBox="1">
-            <a:spLocks/>
-          </p:cNvSpPr>
-          <p:nvPr/>
-        </p:nvSpPr>
-        <p:spPr>
-          <a:xfrm>
-            <a:off x="478453" y="1690318"/>
-            <a:ext cx="10928456" cy="3486801"/>
-          </a:xfrm>
-          <a:prstGeom prst="rect">
-            <a:avLst/>
-          </a:prstGeom>
-        </p:spPr>
-        <p:txBody>
-          <a:bodyPr vert="horz" lIns="91440" tIns="45720" rIns="91440" bIns="45720" rtlCol="0" anchor="ctr">
-            <a:normAutofit/>
-          </a:bodyPr>
-          <a:lstStyle>
-            <a:lvl1pPr algn="l" defTabSz="914400" rtl="0" eaLnBrk="1" latinLnBrk="0" hangingPunct="1">
-              <a:lnSpc>
-                <a:spcPct val="90000"/>
-              </a:lnSpc>
-              <a:spcBef>
-                <a:spcPct val="0"/>
-              </a:spcBef>
-              <a:buNone/>
-              <a:defRPr sz="2800" b="1" kern="1200">
-                <a:solidFill>
-                  <a:srgbClr val="C80000"/>
-                </a:solidFill>
-                <a:latin typeface="微软雅黑" panose="020B0503020204020204" pitchFamily="34" charset="-122"/>
-                <a:ea typeface="微软雅黑" panose="020B0503020204020204" pitchFamily="34" charset="-122"/>
-                <a:cs typeface="+mj-cs"/>
-              </a:defRPr>
-            </a:lvl1pPr>
-          </a:lstStyle>
-          <a:p>
-            <a:pPr>
-              <a:lnSpc>
-                <a:spcPct val="100000"/>
-              </a:lnSpc>
-            </a:pPr>
-            <a:r>
-              <a:rPr lang="en-US" altLang="zh-CN" sz="3000" dirty="0">
-                <a:solidFill>
-                  <a:schemeClr val="tx1">
-                    <a:lumMod val="75000"/>
-                    <a:lumOff val="25000"/>
-                  </a:schemeClr>
-                </a:solidFill>
-                <a:latin typeface="Arial" panose="020B0604020202020204" pitchFamily="34" charset="0"/>
-                <a:cs typeface="Arial" panose="020B0604020202020204" pitchFamily="34" charset="0"/>
-              </a:rPr>
-              <a:t>Questions, Opinions, Criticism?</a:t>
-            </a:r>
-            <a:endParaRPr lang="en-US" altLang="zh-CN" dirty="0">
-              <a:solidFill>
-                <a:schemeClr val="tx1">
-                  <a:lumMod val="75000"/>
-                  <a:lumOff val="25000"/>
-                </a:schemeClr>
-              </a:solidFill>
-              <a:latin typeface="Arial" panose="020B0604020202020204" pitchFamily="34" charset="0"/>
-              <a:cs typeface="Arial" panose="020B0604020202020204" pitchFamily="34" charset="0"/>
-            </a:endParaRPr>
-          </a:p>
-          <a:p>
-            <a:pPr>
-              <a:lnSpc>
-                <a:spcPct val="100000"/>
-              </a:lnSpc>
-            </a:pPr>
-            <a:endParaRPr lang="en-US" altLang="zh-CN" sz="2400" b="0" dirty="0">
-              <a:solidFill>
-                <a:schemeClr val="tx1">
-                  <a:lumMod val="75000"/>
-                  <a:lumOff val="25000"/>
-                </a:schemeClr>
-              </a:solidFill>
-            </a:endParaRPr>
-          </a:p>
-        </p:txBody>
-      </p:sp>
-    </p:spTree>
-    <p:extLst>
-      <p:ext uri="{BB962C8B-B14F-4D97-AF65-F5344CB8AC3E}">
-        <p14:creationId xmlns:p14="http://schemas.microsoft.com/office/powerpoint/2010/main" val="936393930"/>
       </p:ext>
     </p:extLst>
   </p:cSld>
@@ -15406,105 +15043,339 @@
       </p:grpSpPr>
       <p:sp>
         <p:nvSpPr>
-          <p:cNvPr id="2" name="Title 1">
-            <a:extLst>
-              <a:ext uri="{FF2B5EF4-FFF2-40B4-BE49-F238E27FC236}">
-                <a16:creationId xmlns:a16="http://schemas.microsoft.com/office/drawing/2014/main" id="{81CF08C2-7625-453D-900F-44E9B53048B2}"/>
-              </a:ext>
-            </a:extLst>
-          </p:cNvPr>
-          <p:cNvSpPr>
-            <a:spLocks noGrp="1"/>
-          </p:cNvSpPr>
-          <p:nvPr>
-            <p:ph type="title"/>
-          </p:nvPr>
+          <p:cNvPr id="16" name="文本框 15"/>
+          <p:cNvSpPr txBox="1"/>
+          <p:nvPr/>
         </p:nvSpPr>
-        <p:spPr/>
+        <p:spPr>
+          <a:xfrm>
+            <a:off x="475595" y="937268"/>
+            <a:ext cx="7058250" cy="348813"/>
+          </a:xfrm>
+          <a:prstGeom prst="rect">
+            <a:avLst/>
+          </a:prstGeom>
+          <a:noFill/>
+        </p:spPr>
         <p:txBody>
-          <a:bodyPr/>
+          <a:bodyPr wrap="square" rtlCol="0">
+            <a:spAutoFit/>
+          </a:bodyPr>
           <a:lstStyle/>
           <a:p>
-            <a:r>
-              <a:rPr lang="en-GB" dirty="0"/>
-              <a:t>QUESTIONS TO CLARIFY BEFORE PRESENTING</a:t>
-            </a:r>
-            <a:endParaRPr lang="en-US" dirty="0"/>
+            <a:pPr>
+              <a:lnSpc>
+                <a:spcPts val="2000"/>
+              </a:lnSpc>
+            </a:pPr>
+            <a:r>
+              <a:rPr lang="en-US" altLang="zh-CN" b="1" dirty="0">
+                <a:solidFill>
+                  <a:schemeClr val="tx1">
+                    <a:lumMod val="75000"/>
+                    <a:lumOff val="25000"/>
+                  </a:schemeClr>
+                </a:solidFill>
+              </a:rPr>
+              <a:t>IETF117 – ROSA side meeting</a:t>
+            </a:r>
+            <a:endParaRPr lang="zh-CN" altLang="en-US" sz="1200" b="1" dirty="0">
+              <a:solidFill>
+                <a:schemeClr val="tx1">
+                  <a:lumMod val="75000"/>
+                  <a:lumOff val="25000"/>
+                </a:schemeClr>
+              </a:solidFill>
+              <a:latin typeface="微软雅黑" panose="020B0503020204020204" pitchFamily="34" charset="-122"/>
+              <a:ea typeface="微软雅黑" panose="020B0503020204020204" pitchFamily="34" charset="-122"/>
+            </a:endParaRPr>
           </a:p>
         </p:txBody>
       </p:sp>
       <p:sp>
         <p:nvSpPr>
-          <p:cNvPr id="3" name="Content Placeholder 2">
-            <a:extLst>
-              <a:ext uri="{FF2B5EF4-FFF2-40B4-BE49-F238E27FC236}">
-                <a16:creationId xmlns:a16="http://schemas.microsoft.com/office/drawing/2014/main" id="{C1110206-6AF3-4D18-B007-653E679A0FA5}"/>
-              </a:ext>
-            </a:extLst>
-          </p:cNvPr>
-          <p:cNvSpPr>
-            <a:spLocks noGrp="1"/>
-          </p:cNvSpPr>
-          <p:nvPr>
-            <p:ph idx="1"/>
-          </p:nvPr>
+          <p:cNvPr id="17" name="文本框 16"/>
+          <p:cNvSpPr txBox="1"/>
+          <p:nvPr/>
         </p:nvSpPr>
-        <p:spPr/>
+        <p:spPr>
+          <a:xfrm>
+            <a:off x="475595" y="1200332"/>
+            <a:ext cx="8630377" cy="571695"/>
+          </a:xfrm>
+          <a:prstGeom prst="rect">
+            <a:avLst/>
+          </a:prstGeom>
+          <a:noFill/>
+        </p:spPr>
         <p:txBody>
-          <a:bodyPr/>
+          <a:bodyPr wrap="square" rtlCol="0">
+            <a:spAutoFit/>
+          </a:bodyPr>
           <a:lstStyle/>
           <a:p>
-            <a:r>
-              <a:rPr lang="en-GB" dirty="0"/>
-              <a:t>Shall we add deployment discussions (3 slides)?</a:t>
-            </a:r>
-          </a:p>
-          <a:p>
-            <a:endParaRPr lang="en-GB" dirty="0"/>
-          </a:p>
-          <a:p>
-            <a:r>
-              <a:rPr lang="en-GB" dirty="0"/>
-              <a:t>Any other arch information to be added?</a:t>
-            </a:r>
-            <a:endParaRPr lang="en-US" dirty="0"/>
+            <a:pPr>
+              <a:lnSpc>
+                <a:spcPts val="2000"/>
+              </a:lnSpc>
+            </a:pPr>
+            <a:r>
+              <a:rPr lang="en-US" altLang="zh-CN" sz="1000" b="1" dirty="0">
+                <a:solidFill>
+                  <a:schemeClr val="tx1">
+                    <a:lumMod val="75000"/>
+                    <a:lumOff val="25000"/>
+                  </a:schemeClr>
+                </a:solidFill>
+                <a:latin typeface="微软雅黑" panose="020B0503020204020204" pitchFamily="34" charset="-122"/>
+                <a:ea typeface="微软雅黑" panose="020B0503020204020204" pitchFamily="34" charset="-122"/>
+                <a:hlinkClick r:id="rId3"/>
+              </a:rPr>
+              <a:t>https://datatracker.ietf.org/doc/draft-contreras-rtgwg-rosa-gaar/</a:t>
+            </a:r>
+            <a:r>
+              <a:rPr lang="en-US" altLang="zh-CN" sz="1000" b="1" dirty="0">
+                <a:solidFill>
+                  <a:schemeClr val="tx1">
+                    <a:lumMod val="75000"/>
+                    <a:lumOff val="25000"/>
+                  </a:schemeClr>
+                </a:solidFill>
+                <a:latin typeface="微软雅黑" panose="020B0503020204020204" pitchFamily="34" charset="-122"/>
+                <a:ea typeface="微软雅黑" panose="020B0503020204020204" pitchFamily="34" charset="-122"/>
+              </a:rPr>
+              <a:t> </a:t>
+            </a:r>
+          </a:p>
+          <a:p>
+            <a:pPr>
+              <a:lnSpc>
+                <a:spcPts val="2000"/>
+              </a:lnSpc>
+            </a:pPr>
+            <a:r>
+              <a:rPr lang="en-US" altLang="zh-CN" sz="1000" b="1" dirty="0">
+                <a:solidFill>
+                  <a:schemeClr val="tx1">
+                    <a:lumMod val="75000"/>
+                    <a:lumOff val="25000"/>
+                  </a:schemeClr>
+                </a:solidFill>
+                <a:latin typeface="微软雅黑" panose="020B0503020204020204" pitchFamily="34" charset="-122"/>
+                <a:ea typeface="微软雅黑" panose="020B0503020204020204" pitchFamily="34" charset="-122"/>
+                <a:hlinkClick r:id="rId4"/>
+              </a:rPr>
+              <a:t>https://datatracker.ietf.org/doc/html/draft-trossen-rtgwg-rosa-arch</a:t>
+            </a:r>
+            <a:r>
+              <a:rPr lang="en-US" altLang="zh-CN" sz="1000" b="1" dirty="0">
+                <a:solidFill>
+                  <a:schemeClr val="tx1">
+                    <a:lumMod val="75000"/>
+                    <a:lumOff val="25000"/>
+                  </a:schemeClr>
+                </a:solidFill>
+                <a:latin typeface="微软雅黑" panose="020B0503020204020204" pitchFamily="34" charset="-122"/>
+                <a:ea typeface="微软雅黑" panose="020B0503020204020204" pitchFamily="34" charset="-122"/>
+              </a:rPr>
+              <a:t> </a:t>
+            </a:r>
+            <a:endParaRPr lang="zh-CN" altLang="en-US" sz="1000" b="1" dirty="0">
+              <a:solidFill>
+                <a:schemeClr val="tx1">
+                  <a:lumMod val="75000"/>
+                  <a:lumOff val="25000"/>
+                </a:schemeClr>
+              </a:solidFill>
+              <a:latin typeface="微软雅黑" panose="020B0503020204020204" pitchFamily="34" charset="-122"/>
+              <a:ea typeface="微软雅黑" panose="020B0503020204020204" pitchFamily="34" charset="-122"/>
+            </a:endParaRPr>
           </a:p>
         </p:txBody>
       </p:sp>
       <p:sp>
         <p:nvSpPr>
-          <p:cNvPr id="5" name="Slide Number Placeholder 4">
+          <p:cNvPr id="6" name="文本框 14">
             <a:extLst>
               <a:ext uri="{FF2B5EF4-FFF2-40B4-BE49-F238E27FC236}">
-                <a16:creationId xmlns:a16="http://schemas.microsoft.com/office/drawing/2014/main" id="{05FADAB1-9C41-4078-853E-F19B364320AA}"/>
+                <a16:creationId xmlns:a16="http://schemas.microsoft.com/office/drawing/2014/main" id="{E6E3A1F1-5B8D-4B72-B605-E66C5704BD09}"/>
               </a:ext>
             </a:extLst>
           </p:cNvPr>
-          <p:cNvSpPr>
-            <a:spLocks noGrp="1"/>
+          <p:cNvSpPr txBox="1"/>
+          <p:nvPr/>
+        </p:nvSpPr>
+        <p:spPr>
+          <a:xfrm>
+            <a:off x="475595" y="5051881"/>
+            <a:ext cx="4385653" cy="1164550"/>
+          </a:xfrm>
+          <a:prstGeom prst="rect">
+            <a:avLst/>
+          </a:prstGeom>
+          <a:noFill/>
+        </p:spPr>
+        <p:txBody>
+          <a:bodyPr wrap="square" rtlCol="0">
+            <a:spAutoFit/>
+          </a:bodyPr>
+          <a:lstStyle/>
+          <a:p>
+            <a:pPr>
+              <a:lnSpc>
+                <a:spcPct val="150000"/>
+              </a:lnSpc>
+            </a:pPr>
+            <a:endParaRPr lang="en-US" altLang="zh-CN" b="1" dirty="0">
+              <a:solidFill>
+                <a:schemeClr val="tx1">
+                  <a:lumMod val="75000"/>
+                  <a:lumOff val="25000"/>
+                </a:schemeClr>
+              </a:solidFill>
+              <a:latin typeface="微软雅黑" panose="020B0503020204020204" pitchFamily="34" charset="-122"/>
+              <a:ea typeface="微软雅黑" panose="020B0503020204020204" pitchFamily="34" charset="-122"/>
+            </a:endParaRPr>
+          </a:p>
+          <a:p>
+            <a:pPr>
+              <a:lnSpc>
+                <a:spcPct val="150000"/>
+              </a:lnSpc>
+            </a:pPr>
+            <a:r>
+              <a:rPr lang="en-US" altLang="zh-CN" b="1" dirty="0">
+                <a:solidFill>
+                  <a:schemeClr val="tx1">
+                    <a:lumMod val="75000"/>
+                    <a:lumOff val="25000"/>
+                  </a:schemeClr>
+                </a:solidFill>
+                <a:latin typeface="微软雅黑" panose="020B0503020204020204" pitchFamily="34" charset="-122"/>
+                <a:ea typeface="微软雅黑" panose="020B0503020204020204" pitchFamily="34" charset="-122"/>
+              </a:rPr>
+              <a:t>THANKS!</a:t>
+            </a:r>
+          </a:p>
+          <a:p>
+            <a:pPr>
+              <a:lnSpc>
+                <a:spcPts val="2000"/>
+              </a:lnSpc>
+            </a:pPr>
+            <a:r>
+              <a:rPr lang="en-US" altLang="zh-CN" sz="1600" b="1" dirty="0">
+                <a:solidFill>
+                  <a:schemeClr val="tx1">
+                    <a:lumMod val="75000"/>
+                    <a:lumOff val="25000"/>
+                  </a:schemeClr>
+                </a:solidFill>
+                <a:latin typeface="微软雅黑" panose="020B0503020204020204" pitchFamily="34" charset="-122"/>
+                <a:ea typeface="微软雅黑" panose="020B0503020204020204" pitchFamily="34" charset="-122"/>
+              </a:rPr>
+              <a:t>24.07.2023</a:t>
+            </a:r>
+          </a:p>
+        </p:txBody>
+      </p:sp>
+      <p:sp>
+        <p:nvSpPr>
+          <p:cNvPr id="8" name="标题 1">
+            <a:extLst>
+              <a:ext uri="{FF2B5EF4-FFF2-40B4-BE49-F238E27FC236}">
+                <a16:creationId xmlns:a16="http://schemas.microsoft.com/office/drawing/2014/main" id="{5FCF00CF-42D9-4CF9-9FBB-6580E1FB8307}"/>
+              </a:ext>
+            </a:extLst>
+          </p:cNvPr>
+          <p:cNvSpPr txBox="1">
+            <a:spLocks/>
           </p:cNvSpPr>
-          <p:nvPr>
-            <p:ph type="sldNum" sz="quarter" idx="12"/>
-          </p:nvPr>
+          <p:nvPr/>
         </p:nvSpPr>
-        <p:spPr/>
+        <p:spPr>
+          <a:xfrm>
+            <a:off x="478453" y="1690318"/>
+            <a:ext cx="10928456" cy="3486801"/>
+          </a:xfrm>
+          <a:prstGeom prst="rect">
+            <a:avLst/>
+          </a:prstGeom>
+        </p:spPr>
         <p:txBody>
-          <a:bodyPr/>
-          <a:lstStyle/>
-          <a:p>
-            <a:fld id="{58F0DF12-7358-42AF-9D69-5AE0A19CED27}" type="slidenum">
-              <a:rPr lang="zh-CN" altLang="en-US" smtClean="0"/>
-              <a:pPr/>
-              <a:t>9</a:t>
-            </a:fld>
-            <a:endParaRPr lang="zh-CN" altLang="en-US" dirty="0"/>
+          <a:bodyPr vert="horz" lIns="91440" tIns="45720" rIns="91440" bIns="45720" rtlCol="0" anchor="ctr">
+            <a:normAutofit/>
+          </a:bodyPr>
+          <a:lstStyle>
+            <a:lvl1pPr algn="l" defTabSz="914400" rtl="0" eaLnBrk="1" latinLnBrk="0" hangingPunct="1">
+              <a:lnSpc>
+                <a:spcPct val="90000"/>
+              </a:lnSpc>
+              <a:spcBef>
+                <a:spcPct val="0"/>
+              </a:spcBef>
+              <a:buNone/>
+              <a:defRPr sz="2800" b="1" kern="1200">
+                <a:solidFill>
+                  <a:srgbClr val="C80000"/>
+                </a:solidFill>
+                <a:latin typeface="微软雅黑" panose="020B0503020204020204" pitchFamily="34" charset="-122"/>
+                <a:ea typeface="微软雅黑" panose="020B0503020204020204" pitchFamily="34" charset="-122"/>
+                <a:cs typeface="+mj-cs"/>
+              </a:defRPr>
+            </a:lvl1pPr>
+          </a:lstStyle>
+          <a:p>
+            <a:pPr>
+              <a:lnSpc>
+                <a:spcPct val="100000"/>
+              </a:lnSpc>
+            </a:pPr>
+            <a:r>
+              <a:rPr lang="en-US" altLang="zh-CN" sz="3000" dirty="0">
+                <a:solidFill>
+                  <a:schemeClr val="tx1">
+                    <a:lumMod val="75000"/>
+                    <a:lumOff val="25000"/>
+                  </a:schemeClr>
+                </a:solidFill>
+                <a:latin typeface="Arial" panose="020B0604020202020204" pitchFamily="34" charset="0"/>
+                <a:cs typeface="Arial" panose="020B0604020202020204" pitchFamily="34" charset="0"/>
+              </a:rPr>
+              <a:t>Questions, Opinions, Criticism?</a:t>
+            </a:r>
+            <a:endParaRPr lang="en-US" altLang="zh-CN" dirty="0">
+              <a:solidFill>
+                <a:schemeClr val="tx1">
+                  <a:lumMod val="75000"/>
+                  <a:lumOff val="25000"/>
+                </a:schemeClr>
+              </a:solidFill>
+              <a:latin typeface="Arial" panose="020B0604020202020204" pitchFamily="34" charset="0"/>
+              <a:cs typeface="Arial" panose="020B0604020202020204" pitchFamily="34" charset="0"/>
+            </a:endParaRPr>
+          </a:p>
+          <a:p>
+            <a:pPr>
+              <a:lnSpc>
+                <a:spcPct val="100000"/>
+              </a:lnSpc>
+            </a:pPr>
+            <a:endParaRPr lang="en-US" altLang="zh-CN" sz="2400" b="0" dirty="0">
+              <a:solidFill>
+                <a:schemeClr val="tx1">
+                  <a:lumMod val="75000"/>
+                  <a:lumOff val="25000"/>
+                </a:schemeClr>
+              </a:solidFill>
+            </a:endParaRPr>
           </a:p>
         </p:txBody>
       </p:sp>
     </p:spTree>
     <p:extLst>
       <p:ext uri="{BB962C8B-B14F-4D97-AF65-F5344CB8AC3E}">
-        <p14:creationId xmlns:p14="http://schemas.microsoft.com/office/powerpoint/2010/main" val="2308930479"/>
+        <p14:creationId xmlns:p14="http://schemas.microsoft.com/office/powerpoint/2010/main" val="936393930"/>
       </p:ext>
     </p:extLst>
   </p:cSld>

</xml_diff>